<commit_message>
Nova versão do relatório e slides
</commit_message>
<xml_diff>
--- a/Slides.pptx
+++ b/Slides.pptx
@@ -11,9 +11,14 @@
     <p:sldId id="259" r:id="rId5"/>
     <p:sldId id="260" r:id="rId6"/>
     <p:sldId id="261" r:id="rId7"/>
-    <p:sldId id="262" r:id="rId8"/>
-    <p:sldId id="263" r:id="rId9"/>
-    <p:sldId id="264" r:id="rId10"/>
+    <p:sldId id="265" r:id="rId8"/>
+    <p:sldId id="266" r:id="rId9"/>
+    <p:sldId id="262" r:id="rId10"/>
+    <p:sldId id="267" r:id="rId11"/>
+    <p:sldId id="263" r:id="rId12"/>
+    <p:sldId id="264" r:id="rId13"/>
+    <p:sldId id="268" r:id="rId14"/>
+    <p:sldId id="269" r:id="rId15"/>
   </p:sldIdLst>
   <p:sldSz cx="12192000" cy="6858000"/>
   <p:notesSz cx="6858000" cy="9144000"/>
@@ -112,6 +117,11 @@
       </a:defRPr>
     </a:lvl9pPr>
   </p:defaultTextStyle>
+  <p:extLst>
+    <p:ext uri="{EFAFB233-063F-42B5-8137-9DF3F51BA10A}">
+      <p15:sldGuideLst xmlns:p15="http://schemas.microsoft.com/office/powerpoint/2012/main"/>
+    </p:ext>
+  </p:extLst>
 </p:presentation>
 </file>
 
@@ -304,7 +314,7 @@
             <a:fld id="{B61BEF0D-F0BB-DE4B-95CE-6DB70DBA9567}" type="datetimeFigureOut">
               <a:rPr lang="en-US" dirty="0"/>
               <a:pPr/>
-              <a:t>8/9/2015</a:t>
+              <a:t>8/10/2015</a:t>
             </a:fld>
             <a:endParaRPr lang="en-US" dirty="0"/>
           </a:p>
@@ -639,7 +649,7 @@
             <a:fld id="{B61BEF0D-F0BB-DE4B-95CE-6DB70DBA9567}" type="datetimeFigureOut">
               <a:rPr lang="en-US" dirty="0"/>
               <a:pPr/>
-              <a:t>8/9/2015</a:t>
+              <a:t>8/10/2015</a:t>
             </a:fld>
             <a:endParaRPr lang="en-US" dirty="0"/>
           </a:p>
@@ -1037,7 +1047,7 @@
             <a:fld id="{B61BEF0D-F0BB-DE4B-95CE-6DB70DBA9567}" type="datetimeFigureOut">
               <a:rPr lang="en-US" dirty="0"/>
               <a:pPr/>
-              <a:t>8/9/2015</a:t>
+              <a:t>8/10/2015</a:t>
             </a:fld>
             <a:endParaRPr lang="en-US" dirty="0"/>
           </a:p>
@@ -1370,7 +1380,7 @@
             <a:fld id="{B61BEF0D-F0BB-DE4B-95CE-6DB70DBA9567}" type="datetimeFigureOut">
               <a:rPr lang="en-US" dirty="0"/>
               <a:pPr/>
-              <a:t>8/9/2015</a:t>
+              <a:t>8/10/2015</a:t>
             </a:fld>
             <a:endParaRPr lang="en-US" dirty="0"/>
           </a:p>
@@ -1687,7 +1697,7 @@
             <a:fld id="{B61BEF0D-F0BB-DE4B-95CE-6DB70DBA9567}" type="datetimeFigureOut">
               <a:rPr lang="en-US" dirty="0"/>
               <a:pPr/>
-              <a:t>8/9/2015</a:t>
+              <a:t>8/10/2015</a:t>
             </a:fld>
             <a:endParaRPr lang="en-US" dirty="0"/>
           </a:p>
@@ -2080,7 +2090,7 @@
             <a:fld id="{B61BEF0D-F0BB-DE4B-95CE-6DB70DBA9567}" type="datetimeFigureOut">
               <a:rPr lang="en-US" dirty="0"/>
               <a:pPr/>
-              <a:t>8/9/2015</a:t>
+              <a:t>8/10/2015</a:t>
             </a:fld>
             <a:endParaRPr lang="en-US" dirty="0"/>
           </a:p>
@@ -2334,7 +2344,7 @@
             <a:fld id="{B61BEF0D-F0BB-DE4B-95CE-6DB70DBA9567}" type="datetimeFigureOut">
               <a:rPr lang="en-US" dirty="0"/>
               <a:pPr/>
-              <a:t>8/9/2015</a:t>
+              <a:t>8/10/2015</a:t>
             </a:fld>
             <a:endParaRPr lang="en-US" dirty="0"/>
           </a:p>
@@ -2593,7 +2603,7 @@
             <a:fld id="{B61BEF0D-F0BB-DE4B-95CE-6DB70DBA9567}" type="datetimeFigureOut">
               <a:rPr lang="en-US" dirty="0"/>
               <a:pPr/>
-              <a:t>8/9/2015</a:t>
+              <a:t>8/10/2015</a:t>
             </a:fld>
             <a:endParaRPr lang="en-US" dirty="0"/>
           </a:p>
@@ -2852,7 +2862,7 @@
             <a:fld id="{B61BEF0D-F0BB-DE4B-95CE-6DB70DBA9567}" type="datetimeFigureOut">
               <a:rPr lang="en-US" dirty="0"/>
               <a:pPr/>
-              <a:t>8/9/2015</a:t>
+              <a:t>8/10/2015</a:t>
             </a:fld>
             <a:endParaRPr lang="en-US" dirty="0"/>
           </a:p>
@@ -3178,7 +3188,7 @@
             <a:fld id="{B61BEF0D-F0BB-DE4B-95CE-6DB70DBA9567}" type="datetimeFigureOut">
               <a:rPr lang="en-US" dirty="0"/>
               <a:pPr/>
-              <a:t>8/9/2015</a:t>
+              <a:t>8/10/2015</a:t>
             </a:fld>
             <a:endParaRPr lang="en-US" dirty="0"/>
           </a:p>
@@ -3498,7 +3508,7 @@
             <a:fld id="{B61BEF0D-F0BB-DE4B-95CE-6DB70DBA9567}" type="datetimeFigureOut">
               <a:rPr lang="en-US" dirty="0"/>
               <a:pPr/>
-              <a:t>8/9/2015</a:t>
+              <a:t>8/10/2015</a:t>
             </a:fld>
             <a:endParaRPr lang="en-US" dirty="0"/>
           </a:p>
@@ -3952,7 +3962,7 @@
             <a:fld id="{B61BEF0D-F0BB-DE4B-95CE-6DB70DBA9567}" type="datetimeFigureOut">
               <a:rPr lang="en-US" dirty="0"/>
               <a:pPr/>
-              <a:t>8/9/2015</a:t>
+              <a:t>8/10/2015</a:t>
             </a:fld>
             <a:endParaRPr lang="en-US" dirty="0"/>
           </a:p>
@@ -4154,7 +4164,7 @@
             <a:fld id="{B61BEF0D-F0BB-DE4B-95CE-6DB70DBA9567}" type="datetimeFigureOut">
               <a:rPr lang="en-US" dirty="0"/>
               <a:pPr/>
-              <a:t>8/9/2015</a:t>
+              <a:t>8/10/2015</a:t>
             </a:fld>
             <a:endParaRPr lang="en-US" dirty="0"/>
           </a:p>
@@ -4328,7 +4338,7 @@
             <a:fld id="{B61BEF0D-F0BB-DE4B-95CE-6DB70DBA9567}" type="datetimeFigureOut">
               <a:rPr lang="en-US" dirty="0"/>
               <a:pPr/>
-              <a:t>8/9/2015</a:t>
+              <a:t>8/10/2015</a:t>
             </a:fld>
             <a:endParaRPr lang="en-US" dirty="0"/>
           </a:p>
@@ -4658,7 +4668,7 @@
             <a:fld id="{B61BEF0D-F0BB-DE4B-95CE-6DB70DBA9567}" type="datetimeFigureOut">
               <a:rPr lang="en-US" dirty="0"/>
               <a:pPr/>
-              <a:t>8/9/2015</a:t>
+              <a:t>8/10/2015</a:t>
             </a:fld>
             <a:endParaRPr lang="en-US" dirty="0"/>
           </a:p>
@@ -5000,7 +5010,7 @@
             <a:fld id="{B61BEF0D-F0BB-DE4B-95CE-6DB70DBA9567}" type="datetimeFigureOut">
               <a:rPr lang="en-US" dirty="0"/>
               <a:pPr/>
-              <a:t>8/9/2015</a:t>
+              <a:t>8/10/2015</a:t>
             </a:fld>
             <a:endParaRPr lang="en-US" dirty="0"/>
           </a:p>
@@ -7114,7 +7124,7 @@
             <a:fld id="{B61BEF0D-F0BB-DE4B-95CE-6DB70DBA9567}" type="datetimeFigureOut">
               <a:rPr lang="en-US" dirty="0"/>
               <a:pPr/>
-              <a:t>8/9/2015</a:t>
+              <a:t>8/10/2015</a:t>
             </a:fld>
             <a:endParaRPr lang="en-US" dirty="0"/>
           </a:p>
@@ -7688,7 +7698,12 @@
             <p:ph type="subTitle" idx="1"/>
           </p:nvPr>
         </p:nvSpPr>
-        <p:spPr/>
+        <p:spPr>
+          <a:xfrm>
+            <a:off x="2589213" y="4777379"/>
+            <a:ext cx="8915399" cy="387049"/>
+          </a:xfrm>
+        </p:spPr>
         <p:txBody>
           <a:bodyPr/>
           <a:lstStyle/>
@@ -7732,10 +7747,657 @@
           </a:prstGeom>
         </p:spPr>
       </p:pic>
+      <p:sp>
+        <p:nvSpPr>
+          <p:cNvPr id="5" name="Subtítulo 2"/>
+          <p:cNvSpPr txBox="1">
+            <a:spLocks/>
+          </p:cNvSpPr>
+          <p:nvPr/>
+        </p:nvSpPr>
+        <p:spPr>
+          <a:xfrm>
+            <a:off x="9762186" y="5525037"/>
+            <a:ext cx="1742426" cy="965916"/>
+          </a:xfrm>
+          <a:prstGeom prst="rect">
+            <a:avLst/>
+          </a:prstGeom>
+        </p:spPr>
+        <p:txBody>
+          <a:bodyPr vert="horz" lIns="91440" tIns="45720" rIns="91440" bIns="45720" rtlCol="0" anchor="t">
+            <a:normAutofit fontScale="85000" lnSpcReduction="10000"/>
+          </a:bodyPr>
+          <a:lstStyle>
+            <a:lvl1pPr marL="0" indent="0" algn="l" defTabSz="457200" rtl="0" eaLnBrk="1" latinLnBrk="0" hangingPunct="1">
+              <a:spcBef>
+                <a:spcPts val="1000"/>
+              </a:spcBef>
+              <a:spcAft>
+                <a:spcPts val="0"/>
+              </a:spcAft>
+              <a:buClr>
+                <a:schemeClr val="accent1"/>
+              </a:buClr>
+              <a:buFont typeface="Wingdings 3" charset="2"/>
+              <a:buNone/>
+              <a:defRPr sz="1800" kern="1200">
+                <a:solidFill>
+                  <a:schemeClr val="tx1">
+                    <a:lumMod val="65000"/>
+                    <a:lumOff val="35000"/>
+                  </a:schemeClr>
+                </a:solidFill>
+                <a:latin typeface="+mn-lt"/>
+                <a:ea typeface="+mn-ea"/>
+                <a:cs typeface="+mn-cs"/>
+              </a:defRPr>
+            </a:lvl1pPr>
+            <a:lvl2pPr marL="457200" indent="0" algn="ctr" defTabSz="457200" rtl="0" eaLnBrk="1" latinLnBrk="0" hangingPunct="1">
+              <a:spcBef>
+                <a:spcPts val="1000"/>
+              </a:spcBef>
+              <a:spcAft>
+                <a:spcPts val="0"/>
+              </a:spcAft>
+              <a:buClr>
+                <a:schemeClr val="accent1"/>
+              </a:buClr>
+              <a:buFont typeface="Wingdings 3" charset="2"/>
+              <a:buNone/>
+              <a:defRPr sz="1600" kern="1200">
+                <a:solidFill>
+                  <a:schemeClr val="tx1">
+                    <a:tint val="75000"/>
+                  </a:schemeClr>
+                </a:solidFill>
+                <a:latin typeface="+mn-lt"/>
+                <a:ea typeface="+mn-ea"/>
+                <a:cs typeface="+mn-cs"/>
+              </a:defRPr>
+            </a:lvl2pPr>
+            <a:lvl3pPr marL="914400" indent="0" algn="ctr" defTabSz="457200" rtl="0" eaLnBrk="1" latinLnBrk="0" hangingPunct="1">
+              <a:spcBef>
+                <a:spcPts val="1000"/>
+              </a:spcBef>
+              <a:spcAft>
+                <a:spcPts val="0"/>
+              </a:spcAft>
+              <a:buClr>
+                <a:schemeClr val="accent1"/>
+              </a:buClr>
+              <a:buFont typeface="Wingdings 3" charset="2"/>
+              <a:buNone/>
+              <a:defRPr sz="1400" kern="1200">
+                <a:solidFill>
+                  <a:schemeClr val="tx1">
+                    <a:tint val="75000"/>
+                  </a:schemeClr>
+                </a:solidFill>
+                <a:latin typeface="+mn-lt"/>
+                <a:ea typeface="+mn-ea"/>
+                <a:cs typeface="+mn-cs"/>
+              </a:defRPr>
+            </a:lvl3pPr>
+            <a:lvl4pPr marL="1371600" indent="0" algn="ctr" defTabSz="457200" rtl="0" eaLnBrk="1" latinLnBrk="0" hangingPunct="1">
+              <a:spcBef>
+                <a:spcPts val="1000"/>
+              </a:spcBef>
+              <a:spcAft>
+                <a:spcPts val="0"/>
+              </a:spcAft>
+              <a:buClr>
+                <a:schemeClr val="accent1"/>
+              </a:buClr>
+              <a:buFont typeface="Wingdings 3" charset="2"/>
+              <a:buNone/>
+              <a:defRPr sz="1200" kern="1200">
+                <a:solidFill>
+                  <a:schemeClr val="tx1">
+                    <a:tint val="75000"/>
+                  </a:schemeClr>
+                </a:solidFill>
+                <a:latin typeface="+mn-lt"/>
+                <a:ea typeface="+mn-ea"/>
+                <a:cs typeface="+mn-cs"/>
+              </a:defRPr>
+            </a:lvl4pPr>
+            <a:lvl5pPr marL="1828800" indent="0" algn="ctr" defTabSz="457200" rtl="0" eaLnBrk="1" latinLnBrk="0" hangingPunct="1">
+              <a:spcBef>
+                <a:spcPts val="1000"/>
+              </a:spcBef>
+              <a:spcAft>
+                <a:spcPts val="0"/>
+              </a:spcAft>
+              <a:buClr>
+                <a:schemeClr val="accent1"/>
+              </a:buClr>
+              <a:buFont typeface="Wingdings 3" charset="2"/>
+              <a:buNone/>
+              <a:defRPr sz="1200" kern="1200">
+                <a:solidFill>
+                  <a:schemeClr val="tx1">
+                    <a:tint val="75000"/>
+                  </a:schemeClr>
+                </a:solidFill>
+                <a:latin typeface="+mn-lt"/>
+                <a:ea typeface="+mn-ea"/>
+                <a:cs typeface="+mn-cs"/>
+              </a:defRPr>
+            </a:lvl5pPr>
+            <a:lvl6pPr marL="2286000" indent="0" algn="ctr" defTabSz="457200" rtl="0" eaLnBrk="1" latinLnBrk="0" hangingPunct="1">
+              <a:spcBef>
+                <a:spcPts val="1000"/>
+              </a:spcBef>
+              <a:spcAft>
+                <a:spcPts val="0"/>
+              </a:spcAft>
+              <a:buClr>
+                <a:schemeClr val="accent1"/>
+              </a:buClr>
+              <a:buFont typeface="Wingdings 3" charset="2"/>
+              <a:buNone/>
+              <a:defRPr sz="1200" kern="1200">
+                <a:solidFill>
+                  <a:schemeClr val="tx1">
+                    <a:tint val="75000"/>
+                  </a:schemeClr>
+                </a:solidFill>
+                <a:latin typeface="+mn-lt"/>
+                <a:ea typeface="+mn-ea"/>
+                <a:cs typeface="+mn-cs"/>
+              </a:defRPr>
+            </a:lvl6pPr>
+            <a:lvl7pPr marL="2743200" indent="0" algn="ctr" defTabSz="457200" rtl="0" eaLnBrk="1" latinLnBrk="0" hangingPunct="1">
+              <a:spcBef>
+                <a:spcPts val="1000"/>
+              </a:spcBef>
+              <a:spcAft>
+                <a:spcPts val="0"/>
+              </a:spcAft>
+              <a:buClr>
+                <a:schemeClr val="accent1"/>
+              </a:buClr>
+              <a:buFont typeface="Wingdings 3" charset="2"/>
+              <a:buNone/>
+              <a:defRPr sz="1200" kern="1200">
+                <a:solidFill>
+                  <a:schemeClr val="tx1">
+                    <a:tint val="75000"/>
+                  </a:schemeClr>
+                </a:solidFill>
+                <a:latin typeface="+mn-lt"/>
+                <a:ea typeface="+mn-ea"/>
+                <a:cs typeface="+mn-cs"/>
+              </a:defRPr>
+            </a:lvl7pPr>
+            <a:lvl8pPr marL="3200400" indent="0" algn="ctr" defTabSz="457200" rtl="0" eaLnBrk="1" latinLnBrk="0" hangingPunct="1">
+              <a:spcBef>
+                <a:spcPts val="1000"/>
+              </a:spcBef>
+              <a:spcAft>
+                <a:spcPts val="0"/>
+              </a:spcAft>
+              <a:buClr>
+                <a:schemeClr val="accent1"/>
+              </a:buClr>
+              <a:buFont typeface="Wingdings 3" charset="2"/>
+              <a:buNone/>
+              <a:defRPr sz="1200" kern="1200">
+                <a:solidFill>
+                  <a:schemeClr val="tx1">
+                    <a:tint val="75000"/>
+                  </a:schemeClr>
+                </a:solidFill>
+                <a:latin typeface="+mn-lt"/>
+                <a:ea typeface="+mn-ea"/>
+                <a:cs typeface="+mn-cs"/>
+              </a:defRPr>
+            </a:lvl8pPr>
+            <a:lvl9pPr marL="3657600" indent="0" algn="ctr" defTabSz="457200" rtl="0" eaLnBrk="1" latinLnBrk="0" hangingPunct="1">
+              <a:spcBef>
+                <a:spcPts val="1000"/>
+              </a:spcBef>
+              <a:spcAft>
+                <a:spcPts val="0"/>
+              </a:spcAft>
+              <a:buClr>
+                <a:schemeClr val="accent1"/>
+              </a:buClr>
+              <a:buFont typeface="Wingdings 3" charset="2"/>
+              <a:buNone/>
+              <a:defRPr sz="1200" kern="1200">
+                <a:solidFill>
+                  <a:schemeClr val="tx1">
+                    <a:tint val="75000"/>
+                  </a:schemeClr>
+                </a:solidFill>
+                <a:latin typeface="+mn-lt"/>
+                <a:ea typeface="+mn-ea"/>
+                <a:cs typeface="+mn-cs"/>
+              </a:defRPr>
+            </a:lvl9pPr>
+          </a:lstStyle>
+          <a:p>
+            <a:pPr algn="r"/>
+            <a:r>
+              <a:rPr lang="pt-BR" dirty="0" smtClean="0"/>
+              <a:t>Lucas Klein</a:t>
+            </a:r>
+          </a:p>
+          <a:p>
+            <a:pPr algn="r"/>
+            <a:r>
+              <a:rPr lang="pt-BR" dirty="0" smtClean="0"/>
+              <a:t>Tiago Leme</a:t>
+            </a:r>
+          </a:p>
+          <a:p>
+            <a:pPr algn="r"/>
+            <a:r>
+              <a:rPr lang="pt-BR" dirty="0" smtClean="0"/>
+              <a:t>Kanan Castro</a:t>
+            </a:r>
+            <a:endParaRPr lang="pt-BR" dirty="0"/>
+          </a:p>
+        </p:txBody>
+      </p:sp>
     </p:spTree>
     <p:extLst>
       <p:ext uri="{BB962C8B-B14F-4D97-AF65-F5344CB8AC3E}">
         <p14:creationId xmlns:p14="http://schemas.microsoft.com/office/powerpoint/2010/main" val="3238816007"/>
+      </p:ext>
+    </p:extLst>
+  </p:cSld>
+  <p:clrMapOvr>
+    <a:masterClrMapping/>
+  </p:clrMapOvr>
+</p:sld>
+</file>
+
+<file path=ppt/slides/slide10.xml><?xml version="1.0" encoding="utf-8"?>
+<p:sld xmlns:a="http://schemas.openxmlformats.org/drawingml/2006/main" xmlns:r="http://schemas.openxmlformats.org/officeDocument/2006/relationships" xmlns:p="http://schemas.openxmlformats.org/presentationml/2006/main">
+  <p:cSld>
+    <p:spTree>
+      <p:nvGrpSpPr>
+        <p:cNvPr id="1" name=""/>
+        <p:cNvGrpSpPr/>
+        <p:nvPr/>
+      </p:nvGrpSpPr>
+      <p:grpSpPr>
+        <a:xfrm>
+          <a:off x="0" y="0"/>
+          <a:ext cx="0" cy="0"/>
+          <a:chOff x="0" y="0"/>
+          <a:chExt cx="0" cy="0"/>
+        </a:xfrm>
+      </p:grpSpPr>
+      <p:sp>
+        <p:nvSpPr>
+          <p:cNvPr id="2" name="Título 1"/>
+          <p:cNvSpPr>
+            <a:spLocks noGrp="1"/>
+          </p:cNvSpPr>
+          <p:nvPr>
+            <p:ph type="title"/>
+          </p:nvPr>
+        </p:nvSpPr>
+        <p:spPr/>
+        <p:txBody>
+          <a:bodyPr/>
+          <a:lstStyle/>
+          <a:p>
+            <a:r>
+              <a:rPr lang="pt-BR" dirty="0" smtClean="0"/>
+              <a:t>Dados do locador e do aluguel</a:t>
+            </a:r>
+            <a:endParaRPr lang="pt-BR" dirty="0"/>
+          </a:p>
+        </p:txBody>
+      </p:sp>
+      <p:pic>
+        <p:nvPicPr>
+          <p:cNvPr id="4" name="Espaço Reservado para Conteúdo 3"/>
+          <p:cNvPicPr>
+            <a:picLocks noGrp="1" noChangeAspect="1"/>
+          </p:cNvPicPr>
+          <p:nvPr>
+            <p:ph idx="1"/>
+          </p:nvPr>
+        </p:nvPicPr>
+        <p:blipFill>
+          <a:blip r:embed="rId2">
+            <a:extLst>
+              <a:ext uri="{28A0092B-C50C-407E-A947-70E740481C1C}">
+                <a14:useLocalDpi xmlns:a14="http://schemas.microsoft.com/office/drawing/2010/main" val="0"/>
+              </a:ext>
+            </a:extLst>
+          </a:blip>
+          <a:stretch>
+            <a:fillRect/>
+          </a:stretch>
+        </p:blipFill>
+        <p:spPr>
+          <a:xfrm>
+            <a:off x="2573820" y="1425261"/>
+            <a:ext cx="6093662" cy="5144949"/>
+          </a:xfrm>
+        </p:spPr>
+      </p:pic>
+    </p:spTree>
+    <p:extLst>
+      <p:ext uri="{BB962C8B-B14F-4D97-AF65-F5344CB8AC3E}">
+        <p14:creationId xmlns:p14="http://schemas.microsoft.com/office/powerpoint/2010/main" val="2765475438"/>
+      </p:ext>
+    </p:extLst>
+  </p:cSld>
+  <p:clrMapOvr>
+    <a:masterClrMapping/>
+  </p:clrMapOvr>
+</p:sld>
+</file>
+
+<file path=ppt/slides/slide11.xml><?xml version="1.0" encoding="utf-8"?>
+<p:sld xmlns:a="http://schemas.openxmlformats.org/drawingml/2006/main" xmlns:r="http://schemas.openxmlformats.org/officeDocument/2006/relationships" xmlns:p="http://schemas.openxmlformats.org/presentationml/2006/main">
+  <p:cSld>
+    <p:spTree>
+      <p:nvGrpSpPr>
+        <p:cNvPr id="1" name=""/>
+        <p:cNvGrpSpPr/>
+        <p:nvPr/>
+      </p:nvGrpSpPr>
+      <p:grpSpPr>
+        <a:xfrm>
+          <a:off x="0" y="0"/>
+          <a:ext cx="0" cy="0"/>
+          <a:chOff x="0" y="0"/>
+          <a:chExt cx="0" cy="0"/>
+        </a:xfrm>
+      </p:grpSpPr>
+      <p:sp>
+        <p:nvSpPr>
+          <p:cNvPr id="2" name="Título 1"/>
+          <p:cNvSpPr>
+            <a:spLocks noGrp="1"/>
+          </p:cNvSpPr>
+          <p:nvPr>
+            <p:ph type="title"/>
+          </p:nvPr>
+        </p:nvSpPr>
+        <p:spPr/>
+        <p:txBody>
+          <a:bodyPr/>
+          <a:lstStyle/>
+          <a:p>
+            <a:r>
+              <a:rPr lang="pt-BR" dirty="0" smtClean="0"/>
+              <a:t>Cadastro de Carona</a:t>
+            </a:r>
+            <a:endParaRPr lang="pt-BR" dirty="0"/>
+          </a:p>
+        </p:txBody>
+      </p:sp>
+      <p:pic>
+        <p:nvPicPr>
+          <p:cNvPr id="4" name="Espaço Reservado para Conteúdo 3"/>
+          <p:cNvPicPr>
+            <a:picLocks noGrp="1" noChangeAspect="1"/>
+          </p:cNvPicPr>
+          <p:nvPr>
+            <p:ph idx="1"/>
+          </p:nvPr>
+        </p:nvPicPr>
+        <p:blipFill>
+          <a:blip r:embed="rId2">
+            <a:extLst>
+              <a:ext uri="{28A0092B-C50C-407E-A947-70E740481C1C}">
+                <a14:useLocalDpi xmlns:a14="http://schemas.microsoft.com/office/drawing/2010/main" val="0"/>
+              </a:ext>
+            </a:extLst>
+          </a:blip>
+          <a:stretch>
+            <a:fillRect/>
+          </a:stretch>
+        </p:blipFill>
+        <p:spPr>
+          <a:xfrm>
+            <a:off x="2592925" y="1425261"/>
+            <a:ext cx="9212449" cy="4962659"/>
+          </a:xfrm>
+        </p:spPr>
+      </p:pic>
+    </p:spTree>
+    <p:extLst>
+      <p:ext uri="{BB962C8B-B14F-4D97-AF65-F5344CB8AC3E}">
+        <p14:creationId xmlns:p14="http://schemas.microsoft.com/office/powerpoint/2010/main" val="229116417"/>
+      </p:ext>
+    </p:extLst>
+  </p:cSld>
+  <p:clrMapOvr>
+    <a:masterClrMapping/>
+  </p:clrMapOvr>
+</p:sld>
+</file>
+
+<file path=ppt/slides/slide12.xml><?xml version="1.0" encoding="utf-8"?>
+<p:sld xmlns:a="http://schemas.openxmlformats.org/drawingml/2006/main" xmlns:r="http://schemas.openxmlformats.org/officeDocument/2006/relationships" xmlns:p="http://schemas.openxmlformats.org/presentationml/2006/main">
+  <p:cSld>
+    <p:spTree>
+      <p:nvGrpSpPr>
+        <p:cNvPr id="1" name=""/>
+        <p:cNvGrpSpPr/>
+        <p:nvPr/>
+      </p:nvGrpSpPr>
+      <p:grpSpPr>
+        <a:xfrm>
+          <a:off x="0" y="0"/>
+          <a:ext cx="0" cy="0"/>
+          <a:chOff x="0" y="0"/>
+          <a:chExt cx="0" cy="0"/>
+        </a:xfrm>
+      </p:grpSpPr>
+      <p:sp>
+        <p:nvSpPr>
+          <p:cNvPr id="2" name="Título 1"/>
+          <p:cNvSpPr>
+            <a:spLocks noGrp="1"/>
+          </p:cNvSpPr>
+          <p:nvPr>
+            <p:ph type="title"/>
+          </p:nvPr>
+        </p:nvSpPr>
+        <p:spPr/>
+        <p:txBody>
+          <a:bodyPr>
+            <a:normAutofit/>
+          </a:bodyPr>
+          <a:lstStyle/>
+          <a:p>
+            <a:r>
+              <a:rPr lang="pt-BR" sz="3200" dirty="0" smtClean="0"/>
+              <a:t>Dados do condutor</a:t>
+            </a:r>
+            <a:endParaRPr lang="pt-BR" sz="3200" dirty="0"/>
+          </a:p>
+        </p:txBody>
+      </p:sp>
+      <p:pic>
+        <p:nvPicPr>
+          <p:cNvPr id="4" name="Espaço Reservado para Conteúdo 3"/>
+          <p:cNvPicPr>
+            <a:picLocks noGrp="1" noChangeAspect="1"/>
+          </p:cNvPicPr>
+          <p:nvPr>
+            <p:ph idx="1"/>
+          </p:nvPr>
+        </p:nvPicPr>
+        <p:blipFill>
+          <a:blip r:embed="rId2">
+            <a:extLst>
+              <a:ext uri="{28A0092B-C50C-407E-A947-70E740481C1C}">
+                <a14:useLocalDpi xmlns:a14="http://schemas.microsoft.com/office/drawing/2010/main" val="0"/>
+              </a:ext>
+            </a:extLst>
+          </a:blip>
+          <a:stretch>
+            <a:fillRect/>
+          </a:stretch>
+        </p:blipFill>
+        <p:spPr>
+          <a:xfrm>
+            <a:off x="2592925" y="1399503"/>
+            <a:ext cx="8508664" cy="5158299"/>
+          </a:xfrm>
+        </p:spPr>
+      </p:pic>
+    </p:spTree>
+    <p:extLst>
+      <p:ext uri="{BB962C8B-B14F-4D97-AF65-F5344CB8AC3E}">
+        <p14:creationId xmlns:p14="http://schemas.microsoft.com/office/powerpoint/2010/main" val="458601460"/>
+      </p:ext>
+    </p:extLst>
+  </p:cSld>
+  <p:clrMapOvr>
+    <a:masterClrMapping/>
+  </p:clrMapOvr>
+</p:sld>
+</file>
+
+<file path=ppt/slides/slide13.xml><?xml version="1.0" encoding="utf-8"?>
+<p:sld xmlns:a="http://schemas.openxmlformats.org/drawingml/2006/main" xmlns:r="http://schemas.openxmlformats.org/officeDocument/2006/relationships" xmlns:p="http://schemas.openxmlformats.org/presentationml/2006/main">
+  <p:cSld>
+    <p:spTree>
+      <p:nvGrpSpPr>
+        <p:cNvPr id="1" name=""/>
+        <p:cNvGrpSpPr/>
+        <p:nvPr/>
+      </p:nvGrpSpPr>
+      <p:grpSpPr>
+        <a:xfrm>
+          <a:off x="0" y="0"/>
+          <a:ext cx="0" cy="0"/>
+          <a:chOff x="0" y="0"/>
+          <a:chExt cx="0" cy="0"/>
+        </a:xfrm>
+      </p:grpSpPr>
+      <p:sp>
+        <p:nvSpPr>
+          <p:cNvPr id="2" name="Título 1"/>
+          <p:cNvSpPr>
+            <a:spLocks noGrp="1"/>
+          </p:cNvSpPr>
+          <p:nvPr>
+            <p:ph type="title"/>
+          </p:nvPr>
+        </p:nvSpPr>
+        <p:spPr/>
+        <p:txBody>
+          <a:bodyPr/>
+          <a:lstStyle/>
+          <a:p>
+            <a:r>
+              <a:rPr lang="pt-BR" dirty="0" smtClean="0"/>
+              <a:t>Modelo do banco de dados</a:t>
+            </a:r>
+            <a:endParaRPr lang="pt-BR" dirty="0"/>
+          </a:p>
+        </p:txBody>
+      </p:sp>
+      <p:sp>
+        <p:nvSpPr>
+          <p:cNvPr id="3" name="Espaço Reservado para Conteúdo 2"/>
+          <p:cNvSpPr>
+            <a:spLocks noGrp="1"/>
+          </p:cNvSpPr>
+          <p:nvPr>
+            <p:ph idx="1"/>
+          </p:nvPr>
+        </p:nvSpPr>
+        <p:spPr/>
+        <p:txBody>
+          <a:bodyPr/>
+          <a:lstStyle/>
+          <a:p>
+            <a:endParaRPr lang="pt-BR"/>
+          </a:p>
+        </p:txBody>
+      </p:sp>
+    </p:spTree>
+    <p:extLst>
+      <p:ext uri="{BB962C8B-B14F-4D97-AF65-F5344CB8AC3E}">
+        <p14:creationId xmlns:p14="http://schemas.microsoft.com/office/powerpoint/2010/main" val="4029330661"/>
+      </p:ext>
+    </p:extLst>
+  </p:cSld>
+  <p:clrMapOvr>
+    <a:masterClrMapping/>
+  </p:clrMapOvr>
+</p:sld>
+</file>
+
+<file path=ppt/slides/slide14.xml><?xml version="1.0" encoding="utf-8"?>
+<p:sld xmlns:a="http://schemas.openxmlformats.org/drawingml/2006/main" xmlns:r="http://schemas.openxmlformats.org/officeDocument/2006/relationships" xmlns:p="http://schemas.openxmlformats.org/presentationml/2006/main">
+  <p:cSld>
+    <p:spTree>
+      <p:nvGrpSpPr>
+        <p:cNvPr id="1" name=""/>
+        <p:cNvGrpSpPr/>
+        <p:nvPr/>
+      </p:nvGrpSpPr>
+      <p:grpSpPr>
+        <a:xfrm>
+          <a:off x="0" y="0"/>
+          <a:ext cx="0" cy="0"/>
+          <a:chOff x="0" y="0"/>
+          <a:chExt cx="0" cy="0"/>
+        </a:xfrm>
+      </p:grpSpPr>
+      <p:sp>
+        <p:nvSpPr>
+          <p:cNvPr id="4" name="Título 3"/>
+          <p:cNvSpPr>
+            <a:spLocks noGrp="1"/>
+          </p:cNvSpPr>
+          <p:nvPr>
+            <p:ph type="title"/>
+          </p:nvPr>
+        </p:nvSpPr>
+        <p:spPr/>
+        <p:txBody>
+          <a:bodyPr/>
+          <a:lstStyle/>
+          <a:p>
+            <a:r>
+              <a:rPr lang="pt-BR" dirty="0" smtClean="0"/>
+              <a:t>OBRIGADO!!!</a:t>
+            </a:r>
+            <a:endParaRPr lang="pt-BR" dirty="0"/>
+          </a:p>
+        </p:txBody>
+      </p:sp>
+      <p:sp>
+        <p:nvSpPr>
+          <p:cNvPr id="5" name="Espaço Reservado para Texto 4"/>
+          <p:cNvSpPr>
+            <a:spLocks noGrp="1"/>
+          </p:cNvSpPr>
+          <p:nvPr>
+            <p:ph type="body" idx="1"/>
+          </p:nvPr>
+        </p:nvSpPr>
+        <p:spPr/>
+        <p:txBody>
+          <a:bodyPr/>
+          <a:lstStyle/>
+          <a:p>
+            <a:endParaRPr lang="pt-BR"/>
+          </a:p>
+        </p:txBody>
+      </p:sp>
+    </p:spTree>
+    <p:extLst>
+      <p:ext uri="{BB962C8B-B14F-4D97-AF65-F5344CB8AC3E}">
+        <p14:creationId xmlns:p14="http://schemas.microsoft.com/office/powerpoint/2010/main" val="266870817"/>
       </p:ext>
     </p:extLst>
   </p:cSld>
@@ -8072,8 +8734,8 @@
           <a:lstStyle/>
           <a:p>
             <a:r>
-              <a:rPr lang="pt-BR" dirty="0" smtClean="0"/>
-              <a:t>Tela Inicial</a:t>
+              <a:rPr lang="pt-BR" dirty="0" err="1" smtClean="0"/>
+              <a:t>Login</a:t>
             </a:r>
             <a:endParaRPr lang="pt-BR" dirty="0"/>
           </a:p>
@@ -8155,7 +8817,11 @@
           <a:p>
             <a:r>
               <a:rPr lang="pt-BR" dirty="0" smtClean="0"/>
-              <a:t>Cadastro de Usuário</a:t>
+              <a:t>Cadastro de </a:t>
+            </a:r>
+            <a:r>
+              <a:rPr lang="pt-BR" dirty="0" smtClean="0"/>
+              <a:t>usuário</a:t>
             </a:r>
             <a:endParaRPr lang="pt-BR" dirty="0"/>
           </a:p>
@@ -8185,7 +8851,7 @@
         </p:blipFill>
         <p:spPr>
           <a:xfrm>
-            <a:off x="4048238" y="1264555"/>
+            <a:off x="2592925" y="1354707"/>
             <a:ext cx="5131085" cy="5393822"/>
           </a:xfrm>
         </p:spPr>
@@ -8237,7 +8903,7 @@
           <a:p>
             <a:r>
               <a:rPr lang="pt-BR" dirty="0" smtClean="0"/>
-              <a:t>Cadastro de Veículo</a:t>
+              <a:t>Tela inicial</a:t>
             </a:r>
             <a:endParaRPr lang="pt-BR" dirty="0"/>
           </a:p>
@@ -8267,15 +8933,15 @@
         </p:blipFill>
         <p:spPr>
           <a:xfrm>
-            <a:off x="2592925" y="1264554"/>
-            <a:ext cx="8045024" cy="5347435"/>
+            <a:off x="2592925" y="1502534"/>
+            <a:ext cx="9301113" cy="4473263"/>
           </a:xfrm>
         </p:spPr>
       </p:pic>
     </p:spTree>
     <p:extLst>
       <p:ext uri="{BB962C8B-B14F-4D97-AF65-F5344CB8AC3E}">
-        <p14:creationId xmlns:p14="http://schemas.microsoft.com/office/powerpoint/2010/main" val="1017611799"/>
+        <p14:creationId xmlns:p14="http://schemas.microsoft.com/office/powerpoint/2010/main" val="44011938"/>
       </p:ext>
     </p:extLst>
   </p:cSld>
@@ -8319,7 +8985,7 @@
           <a:p>
             <a:r>
               <a:rPr lang="pt-BR" dirty="0" smtClean="0"/>
-              <a:t>Cadastro de Carona</a:t>
+              <a:t>Dados pessoais do usuário</a:t>
             </a:r>
             <a:endParaRPr lang="pt-BR" dirty="0"/>
           </a:p>
@@ -8349,15 +9015,15 @@
         </p:blipFill>
         <p:spPr>
           <a:xfrm>
-            <a:off x="2592925" y="1425261"/>
-            <a:ext cx="9212449" cy="4962659"/>
+            <a:off x="2592925" y="1438139"/>
+            <a:ext cx="7333282" cy="5181601"/>
           </a:xfrm>
         </p:spPr>
       </p:pic>
     </p:spTree>
     <p:extLst>
       <p:ext uri="{BB962C8B-B14F-4D97-AF65-F5344CB8AC3E}">
-        <p14:creationId xmlns:p14="http://schemas.microsoft.com/office/powerpoint/2010/main" val="229116417"/>
+        <p14:creationId xmlns:p14="http://schemas.microsoft.com/office/powerpoint/2010/main" val="995610163"/>
       </p:ext>
     </p:extLst>
   </p:cSld>
@@ -8396,42 +9062,50 @@
         </p:nvSpPr>
         <p:spPr/>
         <p:txBody>
-          <a:bodyPr>
-            <a:normAutofit/>
-          </a:bodyPr>
-          <a:lstStyle/>
-          <a:p>
-            <a:r>
-              <a:rPr lang="pt-BR" sz="3200" dirty="0" smtClean="0"/>
-              <a:t>Relação de Veículos / Caronas Disponíveis</a:t>
-            </a:r>
-            <a:endParaRPr lang="pt-BR" sz="3200" dirty="0"/>
-          </a:p>
-        </p:txBody>
-      </p:sp>
-      <p:sp>
-        <p:nvSpPr>
-          <p:cNvPr id="3" name="Espaço Reservado para Conteúdo 2"/>
-          <p:cNvSpPr>
-            <a:spLocks noGrp="1"/>
-          </p:cNvSpPr>
-          <p:nvPr>
-            <p:ph idx="1"/>
-          </p:nvPr>
-        </p:nvSpPr>
-        <p:spPr/>
-        <p:txBody>
           <a:bodyPr/>
           <a:lstStyle/>
           <a:p>
-            <a:endParaRPr lang="pt-BR"/>
-          </a:p>
-        </p:txBody>
-      </p:sp>
+            <a:r>
+              <a:rPr lang="pt-BR" dirty="0" smtClean="0"/>
+              <a:t>Cadastro de Veículo</a:t>
+            </a:r>
+            <a:endParaRPr lang="pt-BR" dirty="0"/>
+          </a:p>
+        </p:txBody>
+      </p:sp>
+      <p:pic>
+        <p:nvPicPr>
+          <p:cNvPr id="5" name="Espaço Reservado para Conteúdo 4"/>
+          <p:cNvPicPr>
+            <a:picLocks noGrp="1" noChangeAspect="1"/>
+          </p:cNvPicPr>
+          <p:nvPr>
+            <p:ph idx="1"/>
+          </p:nvPr>
+        </p:nvPicPr>
+        <p:blipFill>
+          <a:blip r:embed="rId2">
+            <a:extLst>
+              <a:ext uri="{28A0092B-C50C-407E-A947-70E740481C1C}">
+                <a14:useLocalDpi xmlns:a14="http://schemas.microsoft.com/office/drawing/2010/main" val="0"/>
+              </a:ext>
+            </a:extLst>
+          </a:blip>
+          <a:stretch>
+            <a:fillRect/>
+          </a:stretch>
+        </p:blipFill>
+        <p:spPr>
+          <a:xfrm>
+            <a:off x="2592925" y="1476777"/>
+            <a:ext cx="7748810" cy="5150477"/>
+          </a:xfrm>
+        </p:spPr>
+      </p:pic>
     </p:spTree>
     <p:extLst>
       <p:ext uri="{BB962C8B-B14F-4D97-AF65-F5344CB8AC3E}">
-        <p14:creationId xmlns:p14="http://schemas.microsoft.com/office/powerpoint/2010/main" val="458601460"/>
+        <p14:creationId xmlns:p14="http://schemas.microsoft.com/office/powerpoint/2010/main" val="1017611799"/>
       </p:ext>
     </p:extLst>
   </p:cSld>

</xml_diff>

<commit_message>
alterações no relatório, após os updates do Tiago
</commit_message>
<xml_diff>
--- a/Slides.pptx
+++ b/Slides.pptx
@@ -8817,11 +8817,7 @@
           <a:p>
             <a:r>
               <a:rPr lang="pt-BR" dirty="0" smtClean="0"/>
-              <a:t>Cadastro de </a:t>
-            </a:r>
-            <a:r>
-              <a:rPr lang="pt-BR" dirty="0" smtClean="0"/>
-              <a:t>usuário</a:t>
+              <a:t>Cadastro de usuário</a:t>
             </a:r>
             <a:endParaRPr lang="pt-BR" dirty="0"/>
           </a:p>
@@ -8993,7 +8989,7 @@
       </p:sp>
       <p:pic>
         <p:nvPicPr>
-          <p:cNvPr id="4" name="Espaço Reservado para Conteúdo 3"/>
+          <p:cNvPr id="5" name="Espaço Reservado para Conteúdo 4"/>
           <p:cNvPicPr>
             <a:picLocks noGrp="1" noChangeAspect="1"/>
           </p:cNvPicPr>
@@ -9015,8 +9011,8 @@
         </p:blipFill>
         <p:spPr>
           <a:xfrm>
-            <a:off x="2592925" y="1438139"/>
-            <a:ext cx="7333282" cy="5181601"/>
+            <a:off x="2592925" y="1264555"/>
+            <a:ext cx="5945768" cy="5467984"/>
           </a:xfrm>
         </p:spPr>
       </p:pic>

</xml_diff>

<commit_message>
imagens do relatório e slides atualizados
</commit_message>
<xml_diff>
--- a/Slides.pptx
+++ b/Slides.pptx
@@ -8223,7 +8223,7 @@
       </p:sp>
       <p:pic>
         <p:nvPicPr>
-          <p:cNvPr id="4" name="Espaço Reservado para Conteúdo 3"/>
+          <p:cNvPr id="5" name="Espaço Reservado para Conteúdo 4"/>
           <p:cNvPicPr>
             <a:picLocks noGrp="1" noChangeAspect="1"/>
           </p:cNvPicPr>
@@ -8245,8 +8245,8 @@
         </p:blipFill>
         <p:spPr>
           <a:xfrm>
-            <a:off x="2592925" y="1399503"/>
-            <a:ext cx="8508664" cy="5158299"/>
+            <a:off x="2592924" y="1264555"/>
+            <a:ext cx="8817757" cy="5345684"/>
           </a:xfrm>
         </p:spPr>
       </p:pic>
@@ -8907,7 +8907,7 @@
       </p:sp>
       <p:pic>
         <p:nvPicPr>
-          <p:cNvPr id="4" name="Espaço Reservado para Conteúdo 3"/>
+          <p:cNvPr id="5" name="Espaço Reservado para Conteúdo 4"/>
           <p:cNvPicPr>
             <a:picLocks noGrp="1" noChangeAspect="1"/>
           </p:cNvPicPr>
@@ -8929,8 +8929,8 @@
         </p:blipFill>
         <p:spPr>
           <a:xfrm>
-            <a:off x="2592925" y="1502534"/>
-            <a:ext cx="9301113" cy="4473263"/>
+            <a:off x="2592924" y="1264554"/>
+            <a:ext cx="9386897" cy="4569575"/>
           </a:xfrm>
         </p:spPr>
       </p:pic>
@@ -8989,7 +8989,7 @@
       </p:sp>
       <p:pic>
         <p:nvPicPr>
-          <p:cNvPr id="5" name="Espaço Reservado para Conteúdo 4"/>
+          <p:cNvPr id="4" name="Espaço Reservado para Conteúdo 3"/>
           <p:cNvPicPr>
             <a:picLocks noGrp="1" noChangeAspect="1"/>
           </p:cNvPicPr>
@@ -9011,8 +9011,8 @@
         </p:blipFill>
         <p:spPr>
           <a:xfrm>
-            <a:off x="2592925" y="1264555"/>
-            <a:ext cx="5945768" cy="5467984"/>
+            <a:off x="2708640" y="1264555"/>
+            <a:ext cx="5727021" cy="5390138"/>
           </a:xfrm>
         </p:spPr>
       </p:pic>

</xml_diff>

<commit_message>
alterações no relatório e slides
</commit_message>
<xml_diff>
--- a/Slides.pptx
+++ b/Slides.pptx
@@ -444,7 +444,7 @@
             <a:fld id="{D57F1E4F-1CFF-5643-939E-217C01CDF565}" type="slidenum">
               <a:rPr lang="en-US" dirty="0"/>
               <a:pPr/>
-              <a:t>‹#›</a:t>
+              <a:t>‹nº›</a:t>
             </a:fld>
             <a:endParaRPr lang="en-US" dirty="0"/>
           </a:p>
@@ -779,7 +779,7 @@
             <a:fld id="{D57F1E4F-1CFF-5643-939E-217C01CDF565}" type="slidenum">
               <a:rPr lang="en-US" dirty="0"/>
               <a:pPr/>
-              <a:t>‹#›</a:t>
+              <a:t>‹nº›</a:t>
             </a:fld>
             <a:endParaRPr lang="en-US" dirty="0"/>
           </a:p>
@@ -1177,7 +1177,7 @@
             <a:fld id="{D57F1E4F-1CFF-5643-939E-217C01CDF565}" type="slidenum">
               <a:rPr lang="en-US" dirty="0"/>
               <a:pPr/>
-              <a:t>‹#›</a:t>
+              <a:t>‹nº›</a:t>
             </a:fld>
             <a:endParaRPr lang="en-US" dirty="0"/>
           </a:p>
@@ -1510,7 +1510,7 @@
             <a:fld id="{D57F1E4F-1CFF-5643-939E-217C01CDF565}" type="slidenum">
               <a:rPr lang="en-US" dirty="0"/>
               <a:pPr/>
-              <a:t>‹#›</a:t>
+              <a:t>‹nº›</a:t>
             </a:fld>
             <a:endParaRPr lang="en-US" dirty="0"/>
           </a:p>
@@ -1827,7 +1827,7 @@
             <a:fld id="{D57F1E4F-1CFF-5643-939E-217C01CDF565}" type="slidenum">
               <a:rPr lang="en-US" dirty="0"/>
               <a:pPr/>
-              <a:t>‹#›</a:t>
+              <a:t>‹nº›</a:t>
             </a:fld>
             <a:endParaRPr lang="en-US" dirty="0"/>
           </a:p>
@@ -2220,7 +2220,7 @@
             <a:fld id="{D57F1E4F-1CFF-5643-939E-217C01CDF565}" type="slidenum">
               <a:rPr lang="en-US" dirty="0"/>
               <a:pPr/>
-              <a:t>‹#›</a:t>
+              <a:t>‹nº›</a:t>
             </a:fld>
             <a:endParaRPr lang="en-US" dirty="0"/>
           </a:p>
@@ -2469,7 +2469,7 @@
             <a:fld id="{D57F1E4F-1CFF-5643-939E-217C01CDF565}" type="slidenum">
               <a:rPr lang="en-US" dirty="0"/>
               <a:pPr/>
-              <a:t>‹#›</a:t>
+              <a:t>‹nº›</a:t>
             </a:fld>
             <a:endParaRPr lang="en-US" dirty="0"/>
           </a:p>
@@ -2728,7 +2728,7 @@
             <a:fld id="{D57F1E4F-1CFF-5643-939E-217C01CDF565}" type="slidenum">
               <a:rPr lang="en-US" dirty="0"/>
               <a:pPr/>
-              <a:t>‹#›</a:t>
+              <a:t>‹nº›</a:t>
             </a:fld>
             <a:endParaRPr lang="en-US" dirty="0"/>
           </a:p>
@@ -2987,7 +2987,7 @@
             <a:fld id="{D57F1E4F-1CFF-5643-939E-217C01CDF565}" type="slidenum">
               <a:rPr lang="en-US" dirty="0"/>
               <a:pPr/>
-              <a:t>‹#›</a:t>
+              <a:t>‹nº›</a:t>
             </a:fld>
             <a:endParaRPr lang="en-US" dirty="0"/>
           </a:p>
@@ -3318,7 +3318,7 @@
             <a:fld id="{D57F1E4F-1CFF-5643-939E-217C01CDF565}" type="slidenum">
               <a:rPr lang="en-US" dirty="0"/>
               <a:pPr/>
-              <a:t>‹#›</a:t>
+              <a:t>‹nº›</a:t>
             </a:fld>
             <a:endParaRPr lang="en-US" dirty="0"/>
           </a:p>
@@ -3638,7 +3638,7 @@
             <a:fld id="{D57F1E4F-1CFF-5643-939E-217C01CDF565}" type="slidenum">
               <a:rPr lang="en-US" dirty="0"/>
               <a:pPr/>
-              <a:t>‹#›</a:t>
+              <a:t>‹nº›</a:t>
             </a:fld>
             <a:endParaRPr lang="en-US" dirty="0"/>
           </a:p>
@@ -4092,7 +4092,7 @@
             <a:fld id="{D57F1E4F-1CFF-5643-939E-217C01CDF565}" type="slidenum">
               <a:rPr lang="en-US" dirty="0"/>
               <a:pPr/>
-              <a:t>‹#›</a:t>
+              <a:t>‹nº›</a:t>
             </a:fld>
             <a:endParaRPr lang="en-US" dirty="0"/>
           </a:p>
@@ -4289,7 +4289,7 @@
             <a:fld id="{D57F1E4F-1CFF-5643-939E-217C01CDF565}" type="slidenum">
               <a:rPr lang="en-US" dirty="0"/>
               <a:pPr/>
-              <a:t>‹#›</a:t>
+              <a:t>‹nº›</a:t>
             </a:fld>
             <a:endParaRPr lang="en-US" dirty="0"/>
           </a:p>
@@ -4463,7 +4463,7 @@
             <a:fld id="{D57F1E4F-1CFF-5643-939E-217C01CDF565}" type="slidenum">
               <a:rPr lang="en-US" dirty="0"/>
               <a:pPr/>
-              <a:t>‹#›</a:t>
+              <a:t>‹nº›</a:t>
             </a:fld>
             <a:endParaRPr lang="en-US" dirty="0"/>
           </a:p>
@@ -4793,7 +4793,7 @@
             <a:fld id="{D57F1E4F-1CFF-5643-939E-217C01CDF565}" type="slidenum">
               <a:rPr lang="en-US" dirty="0"/>
               <a:pPr/>
-              <a:t>‹#›</a:t>
+              <a:t>‹nº›</a:t>
             </a:fld>
             <a:endParaRPr lang="en-US" dirty="0"/>
           </a:p>
@@ -5140,7 +5140,7 @@
             <a:fld id="{D57F1E4F-1CFF-5643-939E-217C01CDF565}" type="slidenum">
               <a:rPr lang="en-US" dirty="0"/>
               <a:pPr/>
-              <a:t>‹#›</a:t>
+              <a:t>‹nº›</a:t>
             </a:fld>
             <a:endParaRPr lang="en-US" dirty="0"/>
           </a:p>
@@ -7201,7 +7201,7 @@
             <a:fld id="{D57F1E4F-1CFF-5643-939E-217C01CDF565}" type="slidenum">
               <a:rPr lang="en-US" dirty="0"/>
               <a:pPr/>
-              <a:t>‹#›</a:t>
+              <a:t>‹nº›</a:t>
             </a:fld>
             <a:endParaRPr lang="en-US" dirty="0"/>
           </a:p>
@@ -8057,7 +8057,7 @@
       </p:sp>
       <p:pic>
         <p:nvPicPr>
-          <p:cNvPr id="4" name="Espaço Reservado para Conteúdo 3"/>
+          <p:cNvPr id="5" name="Espaço Reservado para Conteúdo 4"/>
           <p:cNvPicPr>
             <a:picLocks noGrp="1" noChangeAspect="1"/>
           </p:cNvPicPr>
@@ -8079,8 +8079,8 @@
         </p:blipFill>
         <p:spPr>
           <a:xfrm>
-            <a:off x="2573820" y="1425261"/>
-            <a:ext cx="6093662" cy="5144949"/>
+            <a:off x="2592925" y="1264554"/>
+            <a:ext cx="6486681" cy="5444527"/>
           </a:xfrm>
         </p:spPr>
       </p:pic>
@@ -8139,7 +8139,7 @@
       </p:sp>
       <p:pic>
         <p:nvPicPr>
-          <p:cNvPr id="4" name="Espaço Reservado para Conteúdo 3"/>
+          <p:cNvPr id="5" name="Espaço Reservado para Conteúdo 4"/>
           <p:cNvPicPr>
             <a:picLocks noGrp="1" noChangeAspect="1"/>
           </p:cNvPicPr>
@@ -8161,8 +8161,8 @@
         </p:blipFill>
         <p:spPr>
           <a:xfrm>
-            <a:off x="2592925" y="1425261"/>
-            <a:ext cx="9212449" cy="4962659"/>
+            <a:off x="2592926" y="1264554"/>
+            <a:ext cx="9367606" cy="5213519"/>
           </a:xfrm>
         </p:spPr>
       </p:pic>
@@ -8811,7 +8811,7 @@
       </p:sp>
       <p:pic>
         <p:nvPicPr>
-          <p:cNvPr id="4" name="Espaço Reservado para Conteúdo 3"/>
+          <p:cNvPr id="5" name="Espaço Reservado para Conteúdo 4"/>
           <p:cNvPicPr>
             <a:picLocks noGrp="1" noChangeAspect="1"/>
           </p:cNvPicPr>
@@ -8833,8 +8833,8 @@
         </p:blipFill>
         <p:spPr>
           <a:xfrm>
-            <a:off x="2592925" y="1354707"/>
-            <a:ext cx="5131085" cy="5393822"/>
+            <a:off x="2592924" y="1264554"/>
+            <a:ext cx="4902579" cy="5329531"/>
           </a:xfrm>
         </p:spPr>
       </p:pic>
@@ -8893,7 +8893,7 @@
       </p:sp>
       <p:pic>
         <p:nvPicPr>
-          <p:cNvPr id="5" name="Espaço Reservado para Conteúdo 4"/>
+          <p:cNvPr id="4" name="Espaço Reservado para Conteúdo 3"/>
           <p:cNvPicPr>
             <a:picLocks noGrp="1" noChangeAspect="1"/>
           </p:cNvPicPr>
@@ -8915,8 +8915,8 @@
         </p:blipFill>
         <p:spPr>
           <a:xfrm>
-            <a:off x="2592924" y="1264554"/>
-            <a:ext cx="9386897" cy="4569575"/>
+            <a:off x="2592925" y="1264554"/>
+            <a:ext cx="9351012" cy="4518059"/>
           </a:xfrm>
         </p:spPr>
       </p:pic>
@@ -8975,7 +8975,7 @@
       </p:sp>
       <p:pic>
         <p:nvPicPr>
-          <p:cNvPr id="4" name="Espaço Reservado para Conteúdo 3"/>
+          <p:cNvPr id="5" name="Espaço Reservado para Conteúdo 4"/>
           <p:cNvPicPr>
             <a:picLocks noGrp="1" noChangeAspect="1"/>
           </p:cNvPicPr>
@@ -8997,8 +8997,8 @@
         </p:blipFill>
         <p:spPr>
           <a:xfrm>
-            <a:off x="2708640" y="1264555"/>
-            <a:ext cx="5727021" cy="5390138"/>
+            <a:off x="2592925" y="1264555"/>
+            <a:ext cx="5713948" cy="5459619"/>
           </a:xfrm>
         </p:spPr>
       </p:pic>
@@ -9057,7 +9057,7 @@
       </p:sp>
       <p:pic>
         <p:nvPicPr>
-          <p:cNvPr id="5" name="Espaço Reservado para Conteúdo 4"/>
+          <p:cNvPr id="4" name="Espaço Reservado para Conteúdo 3"/>
           <p:cNvPicPr>
             <a:picLocks noGrp="1" noChangeAspect="1"/>
           </p:cNvPicPr>
@@ -9079,8 +9079,8 @@
         </p:blipFill>
         <p:spPr>
           <a:xfrm>
-            <a:off x="2592925" y="1476777"/>
-            <a:ext cx="7748810" cy="5150477"/>
+            <a:off x="2592924" y="1264554"/>
+            <a:ext cx="8083661" cy="5429325"/>
           </a:xfrm>
         </p:spPr>
       </p:pic>

</xml_diff>